<commit_message>
segumos con la presentacion
</commit_message>
<xml_diff>
--- a/Documentacion/Presentacion power point/ReyBoxes - Sistema de Gestión de Taller Mecánico.pptx
+++ b/Documentacion/Presentacion power point/ReyBoxes - Sistema de Gestión de Taller Mecánico.pptx
@@ -2,10 +2,11 @@
 <file path=ppt/presentation.xml><?xml version="1.0" encoding="utf-8"?>
 <p:presentation xmlns:a="http://schemas.openxmlformats.org/drawingml/2006/main" xmlns:r="http://schemas.openxmlformats.org/officeDocument/2006/relationships" xmlns:p="http://schemas.openxmlformats.org/presentationml/2006/main" saveSubsetFonts="1">
   <p:sldMasterIdLst>
-    <p:sldMasterId id="2147483648" r:id="rId1"/>
+    <p:sldMasterId id="2147483660" r:id="rId1"/>
   </p:sldMasterIdLst>
   <p:sldIdLst>
     <p:sldId id="256" r:id="rId2"/>
+    <p:sldId id="257" r:id="rId3"/>
   </p:sldIdLst>
   <p:sldSz cx="12192000" cy="6858000"/>
   <p:notesSz cx="6858000" cy="9144000"/>
@@ -134,7 +135,7 @@
           <p:cNvPr id="2" name="Título 1">
             <a:extLst>
               <a:ext uri="{FF2B5EF4-FFF2-40B4-BE49-F238E27FC236}">
-                <a16:creationId xmlns:a16="http://schemas.microsoft.com/office/drawing/2014/main" id="{59151E5B-E0E8-97FE-4F70-371BFC2B58A4}"/>
+                <a16:creationId xmlns:a16="http://schemas.microsoft.com/office/drawing/2014/main" id="{BCA0BB60-FA8F-5062-C125-C41A533B6FF8}"/>
               </a:ext>
             </a:extLst>
           </p:cNvPr>
@@ -172,7 +173,7 @@
           <p:cNvPr id="3" name="Subtítulo 2">
             <a:extLst>
               <a:ext uri="{FF2B5EF4-FFF2-40B4-BE49-F238E27FC236}">
-                <a16:creationId xmlns:a16="http://schemas.microsoft.com/office/drawing/2014/main" id="{EC832391-7783-73D1-FCD9-862250DD7988}"/>
+                <a16:creationId xmlns:a16="http://schemas.microsoft.com/office/drawing/2014/main" id="{AA644F35-9C68-3B8D-E86B-5727CD8C9FBD}"/>
               </a:ext>
             </a:extLst>
           </p:cNvPr>
@@ -243,7 +244,7 @@
           <p:cNvPr id="4" name="Marcador de fecha 3">
             <a:extLst>
               <a:ext uri="{FF2B5EF4-FFF2-40B4-BE49-F238E27FC236}">
-                <a16:creationId xmlns:a16="http://schemas.microsoft.com/office/drawing/2014/main" id="{1ED195C6-EBAA-D344-2D4D-79A3A45E0A15}"/>
+                <a16:creationId xmlns:a16="http://schemas.microsoft.com/office/drawing/2014/main" id="{FCFB250B-7FB7-D907-97E3-2D7F555945B1}"/>
               </a:ext>
             </a:extLst>
           </p:cNvPr>
@@ -261,7 +262,7 @@
           <a:p>
             <a:fld id="{5168E37E-15F7-438B-818D-F7499F12F3AC}" type="datetimeFigureOut">
               <a:rPr lang="es-ES_tradnl" smtClean="0"/>
-              <a:t>20/05/2025</a:t>
+              <a:t>21/05/2025</a:t>
             </a:fld>
             <a:endParaRPr lang="es-ES_tradnl" dirty="0"/>
           </a:p>
@@ -272,7 +273,7 @@
           <p:cNvPr id="5" name="Marcador de pie de página 4">
             <a:extLst>
               <a:ext uri="{FF2B5EF4-FFF2-40B4-BE49-F238E27FC236}">
-                <a16:creationId xmlns:a16="http://schemas.microsoft.com/office/drawing/2014/main" id="{A92F046E-C42F-94CA-7677-1DBE49037F9B}"/>
+                <a16:creationId xmlns:a16="http://schemas.microsoft.com/office/drawing/2014/main" id="{1093380C-537A-9F34-888D-DB4562236C51}"/>
               </a:ext>
             </a:extLst>
           </p:cNvPr>
@@ -297,7 +298,7 @@
           <p:cNvPr id="6" name="Marcador de número de diapositiva 5">
             <a:extLst>
               <a:ext uri="{FF2B5EF4-FFF2-40B4-BE49-F238E27FC236}">
-                <a16:creationId xmlns:a16="http://schemas.microsoft.com/office/drawing/2014/main" id="{ECE300EA-A728-21A0-F315-C5EEA56BD983}"/>
+                <a16:creationId xmlns:a16="http://schemas.microsoft.com/office/drawing/2014/main" id="{47A99F55-BF72-2B2C-9BC4-C93CD92DDE1C}"/>
               </a:ext>
             </a:extLst>
           </p:cNvPr>
@@ -324,7 +325,7 @@
     </p:spTree>
     <p:extLst>
       <p:ext uri="{BB962C8B-B14F-4D97-AF65-F5344CB8AC3E}">
-        <p14:creationId xmlns:p14="http://schemas.microsoft.com/office/powerpoint/2010/main" val="2734490130"/>
+        <p14:creationId xmlns:p14="http://schemas.microsoft.com/office/powerpoint/2010/main" val="2891237935"/>
       </p:ext>
     </p:extLst>
   </p:cSld>
@@ -356,7 +357,7 @@
           <p:cNvPr id="2" name="Título 1">
             <a:extLst>
               <a:ext uri="{FF2B5EF4-FFF2-40B4-BE49-F238E27FC236}">
-                <a16:creationId xmlns:a16="http://schemas.microsoft.com/office/drawing/2014/main" id="{A5CE342E-A771-740E-8BAE-38515FA23124}"/>
+                <a16:creationId xmlns:a16="http://schemas.microsoft.com/office/drawing/2014/main" id="{B4B22882-774F-E3E8-4D25-3150D7F4C194}"/>
               </a:ext>
             </a:extLst>
           </p:cNvPr>
@@ -385,7 +386,7 @@
           <p:cNvPr id="3" name="Marcador de texto vertical 2">
             <a:extLst>
               <a:ext uri="{FF2B5EF4-FFF2-40B4-BE49-F238E27FC236}">
-                <a16:creationId xmlns:a16="http://schemas.microsoft.com/office/drawing/2014/main" id="{7B70F116-0FE6-C34A-3516-CC9A7AB54F26}"/>
+                <a16:creationId xmlns:a16="http://schemas.microsoft.com/office/drawing/2014/main" id="{6E559BA9-DC67-81BB-861E-DF3BB7517B8A}"/>
               </a:ext>
             </a:extLst>
           </p:cNvPr>
@@ -443,7 +444,7 @@
           <p:cNvPr id="4" name="Marcador de fecha 3">
             <a:extLst>
               <a:ext uri="{FF2B5EF4-FFF2-40B4-BE49-F238E27FC236}">
-                <a16:creationId xmlns:a16="http://schemas.microsoft.com/office/drawing/2014/main" id="{76B25B81-7304-A720-7847-0527F4940A80}"/>
+                <a16:creationId xmlns:a16="http://schemas.microsoft.com/office/drawing/2014/main" id="{340A381A-B21F-A0B4-7978-5669DCAB7E0A}"/>
               </a:ext>
             </a:extLst>
           </p:cNvPr>
@@ -461,7 +462,7 @@
           <a:p>
             <a:fld id="{5168E37E-15F7-438B-818D-F7499F12F3AC}" type="datetimeFigureOut">
               <a:rPr lang="es-ES_tradnl" smtClean="0"/>
-              <a:t>20/05/2025</a:t>
+              <a:t>21/05/2025</a:t>
             </a:fld>
             <a:endParaRPr lang="es-ES_tradnl" dirty="0"/>
           </a:p>
@@ -472,7 +473,7 @@
           <p:cNvPr id="5" name="Marcador de pie de página 4">
             <a:extLst>
               <a:ext uri="{FF2B5EF4-FFF2-40B4-BE49-F238E27FC236}">
-                <a16:creationId xmlns:a16="http://schemas.microsoft.com/office/drawing/2014/main" id="{7C20ED98-7416-1369-AD51-D37EDFE0FBB4}"/>
+                <a16:creationId xmlns:a16="http://schemas.microsoft.com/office/drawing/2014/main" id="{E0EACBD6-83BA-6EFB-AF60-BB8761F7A6D7}"/>
               </a:ext>
             </a:extLst>
           </p:cNvPr>
@@ -497,7 +498,7 @@
           <p:cNvPr id="6" name="Marcador de número de diapositiva 5">
             <a:extLst>
               <a:ext uri="{FF2B5EF4-FFF2-40B4-BE49-F238E27FC236}">
-                <a16:creationId xmlns:a16="http://schemas.microsoft.com/office/drawing/2014/main" id="{9F4CB7E0-AA41-8BBC-F08D-4779189931C9}"/>
+                <a16:creationId xmlns:a16="http://schemas.microsoft.com/office/drawing/2014/main" id="{05E518CA-76AC-DA81-E3F7-454CDBE0C3EC}"/>
               </a:ext>
             </a:extLst>
           </p:cNvPr>
@@ -524,7 +525,7 @@
     </p:spTree>
     <p:extLst>
       <p:ext uri="{BB962C8B-B14F-4D97-AF65-F5344CB8AC3E}">
-        <p14:creationId xmlns:p14="http://schemas.microsoft.com/office/powerpoint/2010/main" val="3241420063"/>
+        <p14:creationId xmlns:p14="http://schemas.microsoft.com/office/powerpoint/2010/main" val="3402096016"/>
       </p:ext>
     </p:extLst>
   </p:cSld>
@@ -556,7 +557,7 @@
           <p:cNvPr id="2" name="Título vertical 1">
             <a:extLst>
               <a:ext uri="{FF2B5EF4-FFF2-40B4-BE49-F238E27FC236}">
-                <a16:creationId xmlns:a16="http://schemas.microsoft.com/office/drawing/2014/main" id="{425CF2C6-CC4E-F08E-406E-E493278473E2}"/>
+                <a16:creationId xmlns:a16="http://schemas.microsoft.com/office/drawing/2014/main" id="{0D2052EC-68DC-8E43-01F8-144B2C6BA6D1}"/>
               </a:ext>
             </a:extLst>
           </p:cNvPr>
@@ -590,7 +591,7 @@
           <p:cNvPr id="3" name="Marcador de texto vertical 2">
             <a:extLst>
               <a:ext uri="{FF2B5EF4-FFF2-40B4-BE49-F238E27FC236}">
-                <a16:creationId xmlns:a16="http://schemas.microsoft.com/office/drawing/2014/main" id="{33916F96-5334-0B44-7EEC-CD839050BB4D}"/>
+                <a16:creationId xmlns:a16="http://schemas.microsoft.com/office/drawing/2014/main" id="{28890ED5-9690-57CF-E5DF-1717BCF6E877}"/>
               </a:ext>
             </a:extLst>
           </p:cNvPr>
@@ -653,7 +654,7 @@
           <p:cNvPr id="4" name="Marcador de fecha 3">
             <a:extLst>
               <a:ext uri="{FF2B5EF4-FFF2-40B4-BE49-F238E27FC236}">
-                <a16:creationId xmlns:a16="http://schemas.microsoft.com/office/drawing/2014/main" id="{86AC2044-E6B5-08FB-4802-EF6F87277ECF}"/>
+                <a16:creationId xmlns:a16="http://schemas.microsoft.com/office/drawing/2014/main" id="{6477BBF4-2DDA-6431-BEC8-02A01AD37098}"/>
               </a:ext>
             </a:extLst>
           </p:cNvPr>
@@ -671,7 +672,7 @@
           <a:p>
             <a:fld id="{5168E37E-15F7-438B-818D-F7499F12F3AC}" type="datetimeFigureOut">
               <a:rPr lang="es-ES_tradnl" smtClean="0"/>
-              <a:t>20/05/2025</a:t>
+              <a:t>21/05/2025</a:t>
             </a:fld>
             <a:endParaRPr lang="es-ES_tradnl" dirty="0"/>
           </a:p>
@@ -682,7 +683,7 @@
           <p:cNvPr id="5" name="Marcador de pie de página 4">
             <a:extLst>
               <a:ext uri="{FF2B5EF4-FFF2-40B4-BE49-F238E27FC236}">
-                <a16:creationId xmlns:a16="http://schemas.microsoft.com/office/drawing/2014/main" id="{0B8D5E36-ABBA-1472-989D-37D958003C9C}"/>
+                <a16:creationId xmlns:a16="http://schemas.microsoft.com/office/drawing/2014/main" id="{B0610DC6-C6F1-BD40-6E12-BF825C1D6E6F}"/>
               </a:ext>
             </a:extLst>
           </p:cNvPr>
@@ -707,7 +708,7 @@
           <p:cNvPr id="6" name="Marcador de número de diapositiva 5">
             <a:extLst>
               <a:ext uri="{FF2B5EF4-FFF2-40B4-BE49-F238E27FC236}">
-                <a16:creationId xmlns:a16="http://schemas.microsoft.com/office/drawing/2014/main" id="{E00E8FBB-62EB-C3CB-1C81-52A4EC10409F}"/>
+                <a16:creationId xmlns:a16="http://schemas.microsoft.com/office/drawing/2014/main" id="{D7019968-F4B1-2366-5E4F-EB69ED1D32D7}"/>
               </a:ext>
             </a:extLst>
           </p:cNvPr>
@@ -734,7 +735,7 @@
     </p:spTree>
     <p:extLst>
       <p:ext uri="{BB962C8B-B14F-4D97-AF65-F5344CB8AC3E}">
-        <p14:creationId xmlns:p14="http://schemas.microsoft.com/office/powerpoint/2010/main" val="4165062240"/>
+        <p14:creationId xmlns:p14="http://schemas.microsoft.com/office/powerpoint/2010/main" val="1577593865"/>
       </p:ext>
     </p:extLst>
   </p:cSld>
@@ -766,7 +767,7 @@
           <p:cNvPr id="2" name="Título 1">
             <a:extLst>
               <a:ext uri="{FF2B5EF4-FFF2-40B4-BE49-F238E27FC236}">
-                <a16:creationId xmlns:a16="http://schemas.microsoft.com/office/drawing/2014/main" id="{E1ACB79A-C538-3A63-411E-BB1BE07D75DE}"/>
+                <a16:creationId xmlns:a16="http://schemas.microsoft.com/office/drawing/2014/main" id="{A8D9B9C0-02F6-0925-0017-2E64916B1F0D}"/>
               </a:ext>
             </a:extLst>
           </p:cNvPr>
@@ -795,7 +796,7 @@
           <p:cNvPr id="3" name="Marcador de contenido 2">
             <a:extLst>
               <a:ext uri="{FF2B5EF4-FFF2-40B4-BE49-F238E27FC236}">
-                <a16:creationId xmlns:a16="http://schemas.microsoft.com/office/drawing/2014/main" id="{D6CAB983-435B-74BE-4890-F44C2C48CD30}"/>
+                <a16:creationId xmlns:a16="http://schemas.microsoft.com/office/drawing/2014/main" id="{68DA7407-05F8-9CFE-A3DB-981CE5E72A3A}"/>
               </a:ext>
             </a:extLst>
           </p:cNvPr>
@@ -853,7 +854,7 @@
           <p:cNvPr id="4" name="Marcador de fecha 3">
             <a:extLst>
               <a:ext uri="{FF2B5EF4-FFF2-40B4-BE49-F238E27FC236}">
-                <a16:creationId xmlns:a16="http://schemas.microsoft.com/office/drawing/2014/main" id="{8B4FCF6A-5789-FAF6-87B8-3F7D8B4066B8}"/>
+                <a16:creationId xmlns:a16="http://schemas.microsoft.com/office/drawing/2014/main" id="{5D488942-EEF7-AEF8-08B2-40BE94FD28A5}"/>
               </a:ext>
             </a:extLst>
           </p:cNvPr>
@@ -871,7 +872,7 @@
           <a:p>
             <a:fld id="{5168E37E-15F7-438B-818D-F7499F12F3AC}" type="datetimeFigureOut">
               <a:rPr lang="es-ES_tradnl" smtClean="0"/>
-              <a:t>20/05/2025</a:t>
+              <a:t>21/05/2025</a:t>
             </a:fld>
             <a:endParaRPr lang="es-ES_tradnl" dirty="0"/>
           </a:p>
@@ -882,7 +883,7 @@
           <p:cNvPr id="5" name="Marcador de pie de página 4">
             <a:extLst>
               <a:ext uri="{FF2B5EF4-FFF2-40B4-BE49-F238E27FC236}">
-                <a16:creationId xmlns:a16="http://schemas.microsoft.com/office/drawing/2014/main" id="{1496FA64-63CC-82F1-9BA4-CD1777F38CA5}"/>
+                <a16:creationId xmlns:a16="http://schemas.microsoft.com/office/drawing/2014/main" id="{1041CB1D-3D9F-6AE8-CD53-7904C72D035D}"/>
               </a:ext>
             </a:extLst>
           </p:cNvPr>
@@ -907,7 +908,7 @@
           <p:cNvPr id="6" name="Marcador de número de diapositiva 5">
             <a:extLst>
               <a:ext uri="{FF2B5EF4-FFF2-40B4-BE49-F238E27FC236}">
-                <a16:creationId xmlns:a16="http://schemas.microsoft.com/office/drawing/2014/main" id="{09345F84-87C0-EB6E-23C1-A46E105DCED2}"/>
+                <a16:creationId xmlns:a16="http://schemas.microsoft.com/office/drawing/2014/main" id="{1CC8CA6F-228F-5CE9-02C6-97EB57290572}"/>
               </a:ext>
             </a:extLst>
           </p:cNvPr>
@@ -934,7 +935,7 @@
     </p:spTree>
     <p:extLst>
       <p:ext uri="{BB962C8B-B14F-4D97-AF65-F5344CB8AC3E}">
-        <p14:creationId xmlns:p14="http://schemas.microsoft.com/office/powerpoint/2010/main" val="638709539"/>
+        <p14:creationId xmlns:p14="http://schemas.microsoft.com/office/powerpoint/2010/main" val="3582941659"/>
       </p:ext>
     </p:extLst>
   </p:cSld>
@@ -966,7 +967,7 @@
           <p:cNvPr id="2" name="Título 1">
             <a:extLst>
               <a:ext uri="{FF2B5EF4-FFF2-40B4-BE49-F238E27FC236}">
-                <a16:creationId xmlns:a16="http://schemas.microsoft.com/office/drawing/2014/main" id="{C117BD08-8E7A-33D0-1FF2-FB7FB0C5CE73}"/>
+                <a16:creationId xmlns:a16="http://schemas.microsoft.com/office/drawing/2014/main" id="{CBB92C13-BF8E-5FAC-E611-7532A1850BA2}"/>
               </a:ext>
             </a:extLst>
           </p:cNvPr>
@@ -1004,7 +1005,7 @@
           <p:cNvPr id="3" name="Marcador de texto 2">
             <a:extLst>
               <a:ext uri="{FF2B5EF4-FFF2-40B4-BE49-F238E27FC236}">
-                <a16:creationId xmlns:a16="http://schemas.microsoft.com/office/drawing/2014/main" id="{9DFA9740-4717-62FF-60B3-300C25476589}"/>
+                <a16:creationId xmlns:a16="http://schemas.microsoft.com/office/drawing/2014/main" id="{7ACBA123-D41A-B631-1A3C-A447CAF37D75}"/>
               </a:ext>
             </a:extLst>
           </p:cNvPr>
@@ -1129,7 +1130,7 @@
           <p:cNvPr id="4" name="Marcador de fecha 3">
             <a:extLst>
               <a:ext uri="{FF2B5EF4-FFF2-40B4-BE49-F238E27FC236}">
-                <a16:creationId xmlns:a16="http://schemas.microsoft.com/office/drawing/2014/main" id="{42358C07-FA75-F29A-EA1A-5A41C861D354}"/>
+                <a16:creationId xmlns:a16="http://schemas.microsoft.com/office/drawing/2014/main" id="{B14F9BB6-4B1D-4902-4371-00CF936C0DC0}"/>
               </a:ext>
             </a:extLst>
           </p:cNvPr>
@@ -1147,7 +1148,7 @@
           <a:p>
             <a:fld id="{5168E37E-15F7-438B-818D-F7499F12F3AC}" type="datetimeFigureOut">
               <a:rPr lang="es-ES_tradnl" smtClean="0"/>
-              <a:t>20/05/2025</a:t>
+              <a:t>21/05/2025</a:t>
             </a:fld>
             <a:endParaRPr lang="es-ES_tradnl" dirty="0"/>
           </a:p>
@@ -1158,7 +1159,7 @@
           <p:cNvPr id="5" name="Marcador de pie de página 4">
             <a:extLst>
               <a:ext uri="{FF2B5EF4-FFF2-40B4-BE49-F238E27FC236}">
-                <a16:creationId xmlns:a16="http://schemas.microsoft.com/office/drawing/2014/main" id="{B484D5B2-CE4A-529C-D615-B5A7BE2C8FB1}"/>
+                <a16:creationId xmlns:a16="http://schemas.microsoft.com/office/drawing/2014/main" id="{1C30F738-BB33-BD22-A49D-97DCE97BC124}"/>
               </a:ext>
             </a:extLst>
           </p:cNvPr>
@@ -1183,7 +1184,7 @@
           <p:cNvPr id="6" name="Marcador de número de diapositiva 5">
             <a:extLst>
               <a:ext uri="{FF2B5EF4-FFF2-40B4-BE49-F238E27FC236}">
-                <a16:creationId xmlns:a16="http://schemas.microsoft.com/office/drawing/2014/main" id="{E3EE53FB-317D-078D-DA37-78B696195FD0}"/>
+                <a16:creationId xmlns:a16="http://schemas.microsoft.com/office/drawing/2014/main" id="{E207F39A-2AD0-3F59-2B61-E64FDD69B4F1}"/>
               </a:ext>
             </a:extLst>
           </p:cNvPr>
@@ -1210,7 +1211,7 @@
     </p:spTree>
     <p:extLst>
       <p:ext uri="{BB962C8B-B14F-4D97-AF65-F5344CB8AC3E}">
-        <p14:creationId xmlns:p14="http://schemas.microsoft.com/office/powerpoint/2010/main" val="3577346580"/>
+        <p14:creationId xmlns:p14="http://schemas.microsoft.com/office/powerpoint/2010/main" val="3164257696"/>
       </p:ext>
     </p:extLst>
   </p:cSld>
@@ -1242,7 +1243,7 @@
           <p:cNvPr id="2" name="Título 1">
             <a:extLst>
               <a:ext uri="{FF2B5EF4-FFF2-40B4-BE49-F238E27FC236}">
-                <a16:creationId xmlns:a16="http://schemas.microsoft.com/office/drawing/2014/main" id="{82F81D20-DE92-9BE6-6848-FE9543815E13}"/>
+                <a16:creationId xmlns:a16="http://schemas.microsoft.com/office/drawing/2014/main" id="{2C213C3F-D5F8-8D41-96ED-61D5C6238A75}"/>
               </a:ext>
             </a:extLst>
           </p:cNvPr>
@@ -1271,7 +1272,7 @@
           <p:cNvPr id="3" name="Marcador de contenido 2">
             <a:extLst>
               <a:ext uri="{FF2B5EF4-FFF2-40B4-BE49-F238E27FC236}">
-                <a16:creationId xmlns:a16="http://schemas.microsoft.com/office/drawing/2014/main" id="{244AC9BE-4576-00B9-7C83-4DE4430521EF}"/>
+                <a16:creationId xmlns:a16="http://schemas.microsoft.com/office/drawing/2014/main" id="{95FA9EB3-EEA0-E094-E816-FE2388BEC46E}"/>
               </a:ext>
             </a:extLst>
           </p:cNvPr>
@@ -1334,7 +1335,7 @@
           <p:cNvPr id="4" name="Marcador de contenido 3">
             <a:extLst>
               <a:ext uri="{FF2B5EF4-FFF2-40B4-BE49-F238E27FC236}">
-                <a16:creationId xmlns:a16="http://schemas.microsoft.com/office/drawing/2014/main" id="{0BC10903-17F5-BEC9-2A49-7956E47C152C}"/>
+                <a16:creationId xmlns:a16="http://schemas.microsoft.com/office/drawing/2014/main" id="{9B077843-12F1-F9E0-4ACB-E516B812CC90}"/>
               </a:ext>
             </a:extLst>
           </p:cNvPr>
@@ -1397,7 +1398,7 @@
           <p:cNvPr id="5" name="Marcador de fecha 4">
             <a:extLst>
               <a:ext uri="{FF2B5EF4-FFF2-40B4-BE49-F238E27FC236}">
-                <a16:creationId xmlns:a16="http://schemas.microsoft.com/office/drawing/2014/main" id="{DF31B8D7-8775-B88C-07DB-FD9276494A77}"/>
+                <a16:creationId xmlns:a16="http://schemas.microsoft.com/office/drawing/2014/main" id="{1F2F433C-63DD-8300-03A8-CCCC0F68BBE3}"/>
               </a:ext>
             </a:extLst>
           </p:cNvPr>
@@ -1415,7 +1416,7 @@
           <a:p>
             <a:fld id="{5168E37E-15F7-438B-818D-F7499F12F3AC}" type="datetimeFigureOut">
               <a:rPr lang="es-ES_tradnl" smtClean="0"/>
-              <a:t>20/05/2025</a:t>
+              <a:t>21/05/2025</a:t>
             </a:fld>
             <a:endParaRPr lang="es-ES_tradnl" dirty="0"/>
           </a:p>
@@ -1426,7 +1427,7 @@
           <p:cNvPr id="6" name="Marcador de pie de página 5">
             <a:extLst>
               <a:ext uri="{FF2B5EF4-FFF2-40B4-BE49-F238E27FC236}">
-                <a16:creationId xmlns:a16="http://schemas.microsoft.com/office/drawing/2014/main" id="{C9F0908A-B684-DA25-9A8F-FDF9B6CFAF73}"/>
+                <a16:creationId xmlns:a16="http://schemas.microsoft.com/office/drawing/2014/main" id="{6889E0A6-986B-4FCB-AC34-41D767EAB43B}"/>
               </a:ext>
             </a:extLst>
           </p:cNvPr>
@@ -1451,7 +1452,7 @@
           <p:cNvPr id="7" name="Marcador de número de diapositiva 6">
             <a:extLst>
               <a:ext uri="{FF2B5EF4-FFF2-40B4-BE49-F238E27FC236}">
-                <a16:creationId xmlns:a16="http://schemas.microsoft.com/office/drawing/2014/main" id="{C29A2015-C23E-0E02-1176-9B6C392AC570}"/>
+                <a16:creationId xmlns:a16="http://schemas.microsoft.com/office/drawing/2014/main" id="{50D4DDA7-4992-B2EE-CF78-26F8E1D3F3D8}"/>
               </a:ext>
             </a:extLst>
           </p:cNvPr>
@@ -1478,7 +1479,7 @@
     </p:spTree>
     <p:extLst>
       <p:ext uri="{BB962C8B-B14F-4D97-AF65-F5344CB8AC3E}">
-        <p14:creationId xmlns:p14="http://schemas.microsoft.com/office/powerpoint/2010/main" val="2856861901"/>
+        <p14:creationId xmlns:p14="http://schemas.microsoft.com/office/powerpoint/2010/main" val="704959539"/>
       </p:ext>
     </p:extLst>
   </p:cSld>
@@ -1510,7 +1511,7 @@
           <p:cNvPr id="2" name="Título 1">
             <a:extLst>
               <a:ext uri="{FF2B5EF4-FFF2-40B4-BE49-F238E27FC236}">
-                <a16:creationId xmlns:a16="http://schemas.microsoft.com/office/drawing/2014/main" id="{7864E08F-376B-59B4-F466-09E30FC9B272}"/>
+                <a16:creationId xmlns:a16="http://schemas.microsoft.com/office/drawing/2014/main" id="{61F35C9A-D6D9-DB9B-533C-C24313558E72}"/>
               </a:ext>
             </a:extLst>
           </p:cNvPr>
@@ -1544,7 +1545,7 @@
           <p:cNvPr id="3" name="Marcador de texto 2">
             <a:extLst>
               <a:ext uri="{FF2B5EF4-FFF2-40B4-BE49-F238E27FC236}">
-                <a16:creationId xmlns:a16="http://schemas.microsoft.com/office/drawing/2014/main" id="{CC0E6F54-D0B0-F348-794D-EE62CF0AB331}"/>
+                <a16:creationId xmlns:a16="http://schemas.microsoft.com/office/drawing/2014/main" id="{8EBBD5DC-CCF8-D485-798B-6AB5C2A0DE82}"/>
               </a:ext>
             </a:extLst>
           </p:cNvPr>
@@ -1615,7 +1616,7 @@
           <p:cNvPr id="4" name="Marcador de contenido 3">
             <a:extLst>
               <a:ext uri="{FF2B5EF4-FFF2-40B4-BE49-F238E27FC236}">
-                <a16:creationId xmlns:a16="http://schemas.microsoft.com/office/drawing/2014/main" id="{309A6DFE-D54E-75B3-2A40-FB12A5D33AE5}"/>
+                <a16:creationId xmlns:a16="http://schemas.microsoft.com/office/drawing/2014/main" id="{0571066C-45D5-022F-A6E3-5932C0375624}"/>
               </a:ext>
             </a:extLst>
           </p:cNvPr>
@@ -1678,7 +1679,7 @@
           <p:cNvPr id="5" name="Marcador de texto 4">
             <a:extLst>
               <a:ext uri="{FF2B5EF4-FFF2-40B4-BE49-F238E27FC236}">
-                <a16:creationId xmlns:a16="http://schemas.microsoft.com/office/drawing/2014/main" id="{D329DA31-834F-5477-D6A7-6CD6F3728828}"/>
+                <a16:creationId xmlns:a16="http://schemas.microsoft.com/office/drawing/2014/main" id="{B4B7F05E-BD82-5B59-AF5B-21EABE9300B0}"/>
               </a:ext>
             </a:extLst>
           </p:cNvPr>
@@ -1749,7 +1750,7 @@
           <p:cNvPr id="6" name="Marcador de contenido 5">
             <a:extLst>
               <a:ext uri="{FF2B5EF4-FFF2-40B4-BE49-F238E27FC236}">
-                <a16:creationId xmlns:a16="http://schemas.microsoft.com/office/drawing/2014/main" id="{1B186A8D-BEA5-7A1F-3B12-4B62A6EBE2EB}"/>
+                <a16:creationId xmlns:a16="http://schemas.microsoft.com/office/drawing/2014/main" id="{93DA352A-B24A-A578-16C3-A76A4C134FA0}"/>
               </a:ext>
             </a:extLst>
           </p:cNvPr>
@@ -1812,7 +1813,7 @@
           <p:cNvPr id="7" name="Marcador de fecha 6">
             <a:extLst>
               <a:ext uri="{FF2B5EF4-FFF2-40B4-BE49-F238E27FC236}">
-                <a16:creationId xmlns:a16="http://schemas.microsoft.com/office/drawing/2014/main" id="{C03D48A4-864B-4824-00EA-702244CA20C3}"/>
+                <a16:creationId xmlns:a16="http://schemas.microsoft.com/office/drawing/2014/main" id="{73E4C548-3725-3D3E-CA44-52463C24CD41}"/>
               </a:ext>
             </a:extLst>
           </p:cNvPr>
@@ -1830,7 +1831,7 @@
           <a:p>
             <a:fld id="{5168E37E-15F7-438B-818D-F7499F12F3AC}" type="datetimeFigureOut">
               <a:rPr lang="es-ES_tradnl" smtClean="0"/>
-              <a:t>20/05/2025</a:t>
+              <a:t>21/05/2025</a:t>
             </a:fld>
             <a:endParaRPr lang="es-ES_tradnl" dirty="0"/>
           </a:p>
@@ -1841,7 +1842,7 @@
           <p:cNvPr id="8" name="Marcador de pie de página 7">
             <a:extLst>
               <a:ext uri="{FF2B5EF4-FFF2-40B4-BE49-F238E27FC236}">
-                <a16:creationId xmlns:a16="http://schemas.microsoft.com/office/drawing/2014/main" id="{013FCEFF-5143-B245-662A-C75FB04198E3}"/>
+                <a16:creationId xmlns:a16="http://schemas.microsoft.com/office/drawing/2014/main" id="{F4FA89FE-04BF-7410-CB28-887B9124DAE9}"/>
               </a:ext>
             </a:extLst>
           </p:cNvPr>
@@ -1866,7 +1867,7 @@
           <p:cNvPr id="9" name="Marcador de número de diapositiva 8">
             <a:extLst>
               <a:ext uri="{FF2B5EF4-FFF2-40B4-BE49-F238E27FC236}">
-                <a16:creationId xmlns:a16="http://schemas.microsoft.com/office/drawing/2014/main" id="{54D12B99-7B35-3631-DCE4-6616D249B9EB}"/>
+                <a16:creationId xmlns:a16="http://schemas.microsoft.com/office/drawing/2014/main" id="{D49070C3-6E3C-0F1C-C57D-0662FC871D3B}"/>
               </a:ext>
             </a:extLst>
           </p:cNvPr>
@@ -1893,7 +1894,7 @@
     </p:spTree>
     <p:extLst>
       <p:ext uri="{BB962C8B-B14F-4D97-AF65-F5344CB8AC3E}">
-        <p14:creationId xmlns:p14="http://schemas.microsoft.com/office/powerpoint/2010/main" val="594634937"/>
+        <p14:creationId xmlns:p14="http://schemas.microsoft.com/office/powerpoint/2010/main" val="3259324078"/>
       </p:ext>
     </p:extLst>
   </p:cSld>
@@ -1925,7 +1926,7 @@
           <p:cNvPr id="2" name="Título 1">
             <a:extLst>
               <a:ext uri="{FF2B5EF4-FFF2-40B4-BE49-F238E27FC236}">
-                <a16:creationId xmlns:a16="http://schemas.microsoft.com/office/drawing/2014/main" id="{8DFC033D-CF2C-194A-882F-7D43D7EDF74F}"/>
+                <a16:creationId xmlns:a16="http://schemas.microsoft.com/office/drawing/2014/main" id="{4D5D79C6-FD52-787D-B7A9-BDAD4CB5D14C}"/>
               </a:ext>
             </a:extLst>
           </p:cNvPr>
@@ -1954,7 +1955,7 @@
           <p:cNvPr id="3" name="Marcador de fecha 2">
             <a:extLst>
               <a:ext uri="{FF2B5EF4-FFF2-40B4-BE49-F238E27FC236}">
-                <a16:creationId xmlns:a16="http://schemas.microsoft.com/office/drawing/2014/main" id="{4B0F85B0-42CF-7491-423E-F4323094060A}"/>
+                <a16:creationId xmlns:a16="http://schemas.microsoft.com/office/drawing/2014/main" id="{292EA502-1273-EF7E-05C2-2C50C1F97BD5}"/>
               </a:ext>
             </a:extLst>
           </p:cNvPr>
@@ -1972,7 +1973,7 @@
           <a:p>
             <a:fld id="{5168E37E-15F7-438B-818D-F7499F12F3AC}" type="datetimeFigureOut">
               <a:rPr lang="es-ES_tradnl" smtClean="0"/>
-              <a:t>20/05/2025</a:t>
+              <a:t>21/05/2025</a:t>
             </a:fld>
             <a:endParaRPr lang="es-ES_tradnl" dirty="0"/>
           </a:p>
@@ -1983,7 +1984,7 @@
           <p:cNvPr id="4" name="Marcador de pie de página 3">
             <a:extLst>
               <a:ext uri="{FF2B5EF4-FFF2-40B4-BE49-F238E27FC236}">
-                <a16:creationId xmlns:a16="http://schemas.microsoft.com/office/drawing/2014/main" id="{35B3E83D-9E3B-FA04-46BB-271BFFEE4491}"/>
+                <a16:creationId xmlns:a16="http://schemas.microsoft.com/office/drawing/2014/main" id="{ACCEFFDD-9F14-8D60-0881-E887520D1DC6}"/>
               </a:ext>
             </a:extLst>
           </p:cNvPr>
@@ -2008,7 +2009,7 @@
           <p:cNvPr id="5" name="Marcador de número de diapositiva 4">
             <a:extLst>
               <a:ext uri="{FF2B5EF4-FFF2-40B4-BE49-F238E27FC236}">
-                <a16:creationId xmlns:a16="http://schemas.microsoft.com/office/drawing/2014/main" id="{D3744009-4B32-9DE5-A884-F8749F2CA120}"/>
+                <a16:creationId xmlns:a16="http://schemas.microsoft.com/office/drawing/2014/main" id="{73E86837-8CFC-2AC3-EA84-E9917B7983E7}"/>
               </a:ext>
             </a:extLst>
           </p:cNvPr>
@@ -2035,7 +2036,7 @@
     </p:spTree>
     <p:extLst>
       <p:ext uri="{BB962C8B-B14F-4D97-AF65-F5344CB8AC3E}">
-        <p14:creationId xmlns:p14="http://schemas.microsoft.com/office/powerpoint/2010/main" val="3503413650"/>
+        <p14:creationId xmlns:p14="http://schemas.microsoft.com/office/powerpoint/2010/main" val="2074756797"/>
       </p:ext>
     </p:extLst>
   </p:cSld>
@@ -2067,7 +2068,7 @@
           <p:cNvPr id="2" name="Marcador de fecha 1">
             <a:extLst>
               <a:ext uri="{FF2B5EF4-FFF2-40B4-BE49-F238E27FC236}">
-                <a16:creationId xmlns:a16="http://schemas.microsoft.com/office/drawing/2014/main" id="{2D239E82-BFAA-D652-9BAB-11DB9F9B7E23}"/>
+                <a16:creationId xmlns:a16="http://schemas.microsoft.com/office/drawing/2014/main" id="{690B410D-E8D7-FB1E-F821-179B504640EA}"/>
               </a:ext>
             </a:extLst>
           </p:cNvPr>
@@ -2085,7 +2086,7 @@
           <a:p>
             <a:fld id="{5168E37E-15F7-438B-818D-F7499F12F3AC}" type="datetimeFigureOut">
               <a:rPr lang="es-ES_tradnl" smtClean="0"/>
-              <a:t>20/05/2025</a:t>
+              <a:t>21/05/2025</a:t>
             </a:fld>
             <a:endParaRPr lang="es-ES_tradnl" dirty="0"/>
           </a:p>
@@ -2096,7 +2097,7 @@
           <p:cNvPr id="3" name="Marcador de pie de página 2">
             <a:extLst>
               <a:ext uri="{FF2B5EF4-FFF2-40B4-BE49-F238E27FC236}">
-                <a16:creationId xmlns:a16="http://schemas.microsoft.com/office/drawing/2014/main" id="{162F7847-4F26-B6DE-8AA2-C54C4A94C233}"/>
+                <a16:creationId xmlns:a16="http://schemas.microsoft.com/office/drawing/2014/main" id="{EF4F5897-029C-E754-36F0-00880C9D2091}"/>
               </a:ext>
             </a:extLst>
           </p:cNvPr>
@@ -2121,7 +2122,7 @@
           <p:cNvPr id="4" name="Marcador de número de diapositiva 3">
             <a:extLst>
               <a:ext uri="{FF2B5EF4-FFF2-40B4-BE49-F238E27FC236}">
-                <a16:creationId xmlns:a16="http://schemas.microsoft.com/office/drawing/2014/main" id="{269A0F4D-8F5C-DA74-C9F3-31B580622CE5}"/>
+                <a16:creationId xmlns:a16="http://schemas.microsoft.com/office/drawing/2014/main" id="{A88E0771-B861-39AC-DC9C-E8F1752880C5}"/>
               </a:ext>
             </a:extLst>
           </p:cNvPr>
@@ -2148,7 +2149,7 @@
     </p:spTree>
     <p:extLst>
       <p:ext uri="{BB962C8B-B14F-4D97-AF65-F5344CB8AC3E}">
-        <p14:creationId xmlns:p14="http://schemas.microsoft.com/office/powerpoint/2010/main" val="3530177591"/>
+        <p14:creationId xmlns:p14="http://schemas.microsoft.com/office/powerpoint/2010/main" val="3962871211"/>
       </p:ext>
     </p:extLst>
   </p:cSld>
@@ -2180,7 +2181,7 @@
           <p:cNvPr id="2" name="Título 1">
             <a:extLst>
               <a:ext uri="{FF2B5EF4-FFF2-40B4-BE49-F238E27FC236}">
-                <a16:creationId xmlns:a16="http://schemas.microsoft.com/office/drawing/2014/main" id="{3AEE86DA-7C01-0231-FBD9-FFAB0138FF4F}"/>
+                <a16:creationId xmlns:a16="http://schemas.microsoft.com/office/drawing/2014/main" id="{F06B5508-256D-E2D6-2FE2-E3C92AF8DE32}"/>
               </a:ext>
             </a:extLst>
           </p:cNvPr>
@@ -2218,7 +2219,7 @@
           <p:cNvPr id="3" name="Marcador de contenido 2">
             <a:extLst>
               <a:ext uri="{FF2B5EF4-FFF2-40B4-BE49-F238E27FC236}">
-                <a16:creationId xmlns:a16="http://schemas.microsoft.com/office/drawing/2014/main" id="{B855F100-DAFA-287D-71AD-A0756AE50D95}"/>
+                <a16:creationId xmlns:a16="http://schemas.microsoft.com/office/drawing/2014/main" id="{0F9FA520-CFB0-87EE-6B0E-ED5F389C7ED7}"/>
               </a:ext>
             </a:extLst>
           </p:cNvPr>
@@ -2309,7 +2310,7 @@
           <p:cNvPr id="4" name="Marcador de texto 3">
             <a:extLst>
               <a:ext uri="{FF2B5EF4-FFF2-40B4-BE49-F238E27FC236}">
-                <a16:creationId xmlns:a16="http://schemas.microsoft.com/office/drawing/2014/main" id="{E3BF8953-6D7A-CB35-9F41-1C5950B1D674}"/>
+                <a16:creationId xmlns:a16="http://schemas.microsoft.com/office/drawing/2014/main" id="{AB304043-E659-C29F-4036-F47263814DEB}"/>
               </a:ext>
             </a:extLst>
           </p:cNvPr>
@@ -2380,7 +2381,7 @@
           <p:cNvPr id="5" name="Marcador de fecha 4">
             <a:extLst>
               <a:ext uri="{FF2B5EF4-FFF2-40B4-BE49-F238E27FC236}">
-                <a16:creationId xmlns:a16="http://schemas.microsoft.com/office/drawing/2014/main" id="{639E6E82-EA07-E41F-E623-7C52948887FE}"/>
+                <a16:creationId xmlns:a16="http://schemas.microsoft.com/office/drawing/2014/main" id="{18BE37D7-9AE8-6D0B-2A50-BE28DF78D236}"/>
               </a:ext>
             </a:extLst>
           </p:cNvPr>
@@ -2398,7 +2399,7 @@
           <a:p>
             <a:fld id="{5168E37E-15F7-438B-818D-F7499F12F3AC}" type="datetimeFigureOut">
               <a:rPr lang="es-ES_tradnl" smtClean="0"/>
-              <a:t>20/05/2025</a:t>
+              <a:t>21/05/2025</a:t>
             </a:fld>
             <a:endParaRPr lang="es-ES_tradnl" dirty="0"/>
           </a:p>
@@ -2409,7 +2410,7 @@
           <p:cNvPr id="6" name="Marcador de pie de página 5">
             <a:extLst>
               <a:ext uri="{FF2B5EF4-FFF2-40B4-BE49-F238E27FC236}">
-                <a16:creationId xmlns:a16="http://schemas.microsoft.com/office/drawing/2014/main" id="{7B173108-0D5D-BE32-D085-FA3C348102DA}"/>
+                <a16:creationId xmlns:a16="http://schemas.microsoft.com/office/drawing/2014/main" id="{914EDBD1-AD94-D7F0-E876-31A9B50984A5}"/>
               </a:ext>
             </a:extLst>
           </p:cNvPr>
@@ -2434,7 +2435,7 @@
           <p:cNvPr id="7" name="Marcador de número de diapositiva 6">
             <a:extLst>
               <a:ext uri="{FF2B5EF4-FFF2-40B4-BE49-F238E27FC236}">
-                <a16:creationId xmlns:a16="http://schemas.microsoft.com/office/drawing/2014/main" id="{D9AB5A2C-E9E9-C15F-692B-3DD8C87821D9}"/>
+                <a16:creationId xmlns:a16="http://schemas.microsoft.com/office/drawing/2014/main" id="{6C7DE186-DB7F-57D0-4077-BFCE4EC82564}"/>
               </a:ext>
             </a:extLst>
           </p:cNvPr>
@@ -2461,7 +2462,7 @@
     </p:spTree>
     <p:extLst>
       <p:ext uri="{BB962C8B-B14F-4D97-AF65-F5344CB8AC3E}">
-        <p14:creationId xmlns:p14="http://schemas.microsoft.com/office/powerpoint/2010/main" val="738615488"/>
+        <p14:creationId xmlns:p14="http://schemas.microsoft.com/office/powerpoint/2010/main" val="66678178"/>
       </p:ext>
     </p:extLst>
   </p:cSld>
@@ -2493,7 +2494,7 @@
           <p:cNvPr id="2" name="Título 1">
             <a:extLst>
               <a:ext uri="{FF2B5EF4-FFF2-40B4-BE49-F238E27FC236}">
-                <a16:creationId xmlns:a16="http://schemas.microsoft.com/office/drawing/2014/main" id="{B3CED2AC-F593-1ADC-ECEA-3C323E2F8EE3}"/>
+                <a16:creationId xmlns:a16="http://schemas.microsoft.com/office/drawing/2014/main" id="{76277B00-2F44-7EDB-4C0C-24FA57CED747}"/>
               </a:ext>
             </a:extLst>
           </p:cNvPr>
@@ -2531,7 +2532,7 @@
           <p:cNvPr id="3" name="Marcador de posición de imagen 2">
             <a:extLst>
               <a:ext uri="{FF2B5EF4-FFF2-40B4-BE49-F238E27FC236}">
-                <a16:creationId xmlns:a16="http://schemas.microsoft.com/office/drawing/2014/main" id="{04BAA798-B491-DAC2-ACE0-830E1FD127B6}"/>
+                <a16:creationId xmlns:a16="http://schemas.microsoft.com/office/drawing/2014/main" id="{45A8CF14-FCC9-BD62-CBCF-C8A24A9A3117}"/>
               </a:ext>
             </a:extLst>
           </p:cNvPr>
@@ -2598,7 +2599,7 @@
           <p:cNvPr id="4" name="Marcador de texto 3">
             <a:extLst>
               <a:ext uri="{FF2B5EF4-FFF2-40B4-BE49-F238E27FC236}">
-                <a16:creationId xmlns:a16="http://schemas.microsoft.com/office/drawing/2014/main" id="{4AAECBA6-15F2-BD4B-63DF-A9B401EE785D}"/>
+                <a16:creationId xmlns:a16="http://schemas.microsoft.com/office/drawing/2014/main" id="{823425BF-BA47-CE4E-7CFF-508E222EB7CB}"/>
               </a:ext>
             </a:extLst>
           </p:cNvPr>
@@ -2669,7 +2670,7 @@
           <p:cNvPr id="5" name="Marcador de fecha 4">
             <a:extLst>
               <a:ext uri="{FF2B5EF4-FFF2-40B4-BE49-F238E27FC236}">
-                <a16:creationId xmlns:a16="http://schemas.microsoft.com/office/drawing/2014/main" id="{D15C8FD3-07C1-3AAE-0107-EFB744902596}"/>
+                <a16:creationId xmlns:a16="http://schemas.microsoft.com/office/drawing/2014/main" id="{45E87245-81FC-5F60-77EF-BD8BB698387C}"/>
               </a:ext>
             </a:extLst>
           </p:cNvPr>
@@ -2687,7 +2688,7 @@
           <a:p>
             <a:fld id="{5168E37E-15F7-438B-818D-F7499F12F3AC}" type="datetimeFigureOut">
               <a:rPr lang="es-ES_tradnl" smtClean="0"/>
-              <a:t>20/05/2025</a:t>
+              <a:t>21/05/2025</a:t>
             </a:fld>
             <a:endParaRPr lang="es-ES_tradnl" dirty="0"/>
           </a:p>
@@ -2698,7 +2699,7 @@
           <p:cNvPr id="6" name="Marcador de pie de página 5">
             <a:extLst>
               <a:ext uri="{FF2B5EF4-FFF2-40B4-BE49-F238E27FC236}">
-                <a16:creationId xmlns:a16="http://schemas.microsoft.com/office/drawing/2014/main" id="{BE3D7CF0-4478-1210-40FE-85203003B84E}"/>
+                <a16:creationId xmlns:a16="http://schemas.microsoft.com/office/drawing/2014/main" id="{B7E0BF1B-D487-8677-7FF6-124A7B3ACFD4}"/>
               </a:ext>
             </a:extLst>
           </p:cNvPr>
@@ -2723,7 +2724,7 @@
           <p:cNvPr id="7" name="Marcador de número de diapositiva 6">
             <a:extLst>
               <a:ext uri="{FF2B5EF4-FFF2-40B4-BE49-F238E27FC236}">
-                <a16:creationId xmlns:a16="http://schemas.microsoft.com/office/drawing/2014/main" id="{1E53F851-8468-EE76-8906-3F661C88E470}"/>
+                <a16:creationId xmlns:a16="http://schemas.microsoft.com/office/drawing/2014/main" id="{B6499D79-2583-CFDF-0CF9-E8598951686C}"/>
               </a:ext>
             </a:extLst>
           </p:cNvPr>
@@ -2750,7 +2751,7 @@
     </p:spTree>
     <p:extLst>
       <p:ext uri="{BB962C8B-B14F-4D97-AF65-F5344CB8AC3E}">
-        <p14:creationId xmlns:p14="http://schemas.microsoft.com/office/powerpoint/2010/main" val="3096759678"/>
+        <p14:creationId xmlns:p14="http://schemas.microsoft.com/office/powerpoint/2010/main" val="4142855272"/>
       </p:ext>
     </p:extLst>
   </p:cSld>
@@ -2787,7 +2788,7 @@
           <p:cNvPr id="2" name="Marcador de título 1">
             <a:extLst>
               <a:ext uri="{FF2B5EF4-FFF2-40B4-BE49-F238E27FC236}">
-                <a16:creationId xmlns:a16="http://schemas.microsoft.com/office/drawing/2014/main" id="{1B9511F2-768D-3151-6CB2-185DBD525A5B}"/>
+                <a16:creationId xmlns:a16="http://schemas.microsoft.com/office/drawing/2014/main" id="{BD600DEE-8520-E972-383F-521B3E90F52C}"/>
               </a:ext>
             </a:extLst>
           </p:cNvPr>
@@ -2826,7 +2827,7 @@
           <p:cNvPr id="3" name="Marcador de texto 2">
             <a:extLst>
               <a:ext uri="{FF2B5EF4-FFF2-40B4-BE49-F238E27FC236}">
-                <a16:creationId xmlns:a16="http://schemas.microsoft.com/office/drawing/2014/main" id="{1E15CCC6-3490-E1A4-8171-9A16FAE2581B}"/>
+                <a16:creationId xmlns:a16="http://schemas.microsoft.com/office/drawing/2014/main" id="{EDD8503A-AEB2-63E7-537A-A96434F4B5EF}"/>
               </a:ext>
             </a:extLst>
           </p:cNvPr>
@@ -2894,7 +2895,7 @@
           <p:cNvPr id="4" name="Marcador de fecha 3">
             <a:extLst>
               <a:ext uri="{FF2B5EF4-FFF2-40B4-BE49-F238E27FC236}">
-                <a16:creationId xmlns:a16="http://schemas.microsoft.com/office/drawing/2014/main" id="{8D045CF2-18C8-16C6-893B-4A11C46538A3}"/>
+                <a16:creationId xmlns:a16="http://schemas.microsoft.com/office/drawing/2014/main" id="{19826989-E39E-E55A-08A2-B71868D59C27}"/>
               </a:ext>
             </a:extLst>
           </p:cNvPr>
@@ -2930,7 +2931,7 @@
           <a:p>
             <a:fld id="{5168E37E-15F7-438B-818D-F7499F12F3AC}" type="datetimeFigureOut">
               <a:rPr lang="es-ES_tradnl" smtClean="0"/>
-              <a:t>20/05/2025</a:t>
+              <a:t>21/05/2025</a:t>
             </a:fld>
             <a:endParaRPr lang="es-ES_tradnl" dirty="0"/>
           </a:p>
@@ -2941,7 +2942,7 @@
           <p:cNvPr id="5" name="Marcador de pie de página 4">
             <a:extLst>
               <a:ext uri="{FF2B5EF4-FFF2-40B4-BE49-F238E27FC236}">
-                <a16:creationId xmlns:a16="http://schemas.microsoft.com/office/drawing/2014/main" id="{8042ECAE-D51D-F449-95A4-9B6517CC4A5C}"/>
+                <a16:creationId xmlns:a16="http://schemas.microsoft.com/office/drawing/2014/main" id="{74D0AA52-B935-1AD7-0F7B-00AA1C8670D5}"/>
               </a:ext>
             </a:extLst>
           </p:cNvPr>
@@ -2984,7 +2985,7 @@
           <p:cNvPr id="6" name="Marcador de número de diapositiva 5">
             <a:extLst>
               <a:ext uri="{FF2B5EF4-FFF2-40B4-BE49-F238E27FC236}">
-                <a16:creationId xmlns:a16="http://schemas.microsoft.com/office/drawing/2014/main" id="{6F40B7D4-F4E8-5A8C-478F-FF531BE8A418}"/>
+                <a16:creationId xmlns:a16="http://schemas.microsoft.com/office/drawing/2014/main" id="{195E830C-FCC6-832D-4269-FED310E282CF}"/>
               </a:ext>
             </a:extLst>
           </p:cNvPr>
@@ -3029,23 +3030,23 @@
     </p:spTree>
     <p:extLst>
       <p:ext uri="{BB962C8B-B14F-4D97-AF65-F5344CB8AC3E}">
-        <p14:creationId xmlns:p14="http://schemas.microsoft.com/office/powerpoint/2010/main" val="3027338824"/>
+        <p14:creationId xmlns:p14="http://schemas.microsoft.com/office/powerpoint/2010/main" val="2431139887"/>
       </p:ext>
     </p:extLst>
   </p:cSld>
   <p:clrMap bg1="lt1" tx1="dk1" bg2="lt2" tx2="dk2" accent1="accent1" accent2="accent2" accent3="accent3" accent4="accent4" accent5="accent5" accent6="accent6" hlink="hlink" folHlink="folHlink"/>
   <p:sldLayoutIdLst>
-    <p:sldLayoutId id="2147483649" r:id="rId1"/>
-    <p:sldLayoutId id="2147483650" r:id="rId2"/>
-    <p:sldLayoutId id="2147483651" r:id="rId3"/>
-    <p:sldLayoutId id="2147483652" r:id="rId4"/>
-    <p:sldLayoutId id="2147483653" r:id="rId5"/>
-    <p:sldLayoutId id="2147483654" r:id="rId6"/>
-    <p:sldLayoutId id="2147483655" r:id="rId7"/>
-    <p:sldLayoutId id="2147483656" r:id="rId8"/>
-    <p:sldLayoutId id="2147483657" r:id="rId9"/>
-    <p:sldLayoutId id="2147483658" r:id="rId10"/>
-    <p:sldLayoutId id="2147483659" r:id="rId11"/>
+    <p:sldLayoutId id="2147483661" r:id="rId1"/>
+    <p:sldLayoutId id="2147483662" r:id="rId2"/>
+    <p:sldLayoutId id="2147483663" r:id="rId3"/>
+    <p:sldLayoutId id="2147483664" r:id="rId4"/>
+    <p:sldLayoutId id="2147483665" r:id="rId5"/>
+    <p:sldLayoutId id="2147483666" r:id="rId6"/>
+    <p:sldLayoutId id="2147483667" r:id="rId7"/>
+    <p:sldLayoutId id="2147483668" r:id="rId8"/>
+    <p:sldLayoutId id="2147483669" r:id="rId9"/>
+    <p:sldLayoutId id="2147483670" r:id="rId10"/>
+    <p:sldLayoutId id="2147483671" r:id="rId11"/>
   </p:sldLayoutIdLst>
   <p:txStyles>
     <p:titleStyle>
@@ -3363,6 +3364,7 @@
         </p:nvPicPr>
         <p:blipFill>
           <a:blip r:embed="rId2">
+            <a:alphaModFix amt="50000"/>
             <a:extLst>
               <a:ext uri="{28A0092B-C50C-407E-A947-70E740481C1C}">
                 <a14:useLocalDpi xmlns:a14="http://schemas.microsoft.com/office/drawing/2010/main" val="0"/>
@@ -3381,6 +3383,9 @@
           <a:prstGeom prst="rect">
             <a:avLst/>
           </a:prstGeom>
+          <a:effectLst>
+            <a:reflection stA="45000" endPos="65000" dist="50800" dir="5400000" sy="-100000" algn="bl" rotWithShape="0"/>
+          </a:effectLst>
         </p:spPr>
       </p:pic>
       <p:sp>
@@ -3404,6 +3409,7 @@
             <a:off x="1524000" y="216590"/>
             <a:ext cx="9144000" cy="2387600"/>
           </a:xfrm>
+          <a:effectLst/>
         </p:spPr>
         <p:txBody>
           <a:bodyPr>
@@ -3416,6 +3422,13 @@
                 <a:solidFill>
                   <a:srgbClr val="454545"/>
                 </a:solidFill>
+                <a:effectLst>
+                  <a:outerShdw blurRad="50800" dist="38100" dir="5400000" algn="t" rotWithShape="0">
+                    <a:prstClr val="black">
+                      <a:alpha val="40000"/>
+                    </a:prstClr>
+                  </a:outerShdw>
+                </a:effectLst>
                 <a:latin typeface="Montserrat" pitchFamily="2" charset="0"/>
               </a:rPr>
               <a:t>Rey</a:t>
@@ -3425,28 +3438,63 @@
                 <a:solidFill>
                   <a:srgbClr val="EA1B26"/>
                 </a:solidFill>
+                <a:effectLst>
+                  <a:outerShdw blurRad="50800" dist="38100" dir="5400000" algn="t" rotWithShape="0">
+                    <a:prstClr val="black">
+                      <a:alpha val="40000"/>
+                    </a:prstClr>
+                  </a:outerShdw>
+                </a:effectLst>
                 <a:latin typeface="Montserrat" pitchFamily="2" charset="0"/>
               </a:rPr>
               <a:t>Boxes</a:t>
             </a:r>
             <a:r>
               <a:rPr lang="es-ES" b="1" i="1" dirty="0">
+                <a:effectLst>
+                  <a:outerShdw blurRad="50800" dist="38100" dir="5400000" algn="t" rotWithShape="0">
+                    <a:prstClr val="black">
+                      <a:alpha val="40000"/>
+                    </a:prstClr>
+                  </a:outerShdw>
+                </a:effectLst>
                 <a:latin typeface="Montserrat" pitchFamily="2" charset="0"/>
               </a:rPr>
               <a:t>  </a:t>
             </a:r>
             <a:br>
               <a:rPr lang="es-ES" b="1" i="1" dirty="0">
+                <a:effectLst>
+                  <a:outerShdw blurRad="50800" dist="38100" dir="5400000" algn="t" rotWithShape="0">
+                    <a:prstClr val="black">
+                      <a:alpha val="40000"/>
+                    </a:prstClr>
+                  </a:outerShdw>
+                </a:effectLst>
                 <a:latin typeface="Montserrat" pitchFamily="2" charset="0"/>
               </a:rPr>
             </a:br>
             <a:r>
-              <a:rPr lang="es-ES" sz="4400" b="1" i="1" dirty="0">
+              <a:rPr lang="es-ES" sz="4400" dirty="0">
+                <a:effectLst>
+                  <a:outerShdw blurRad="50800" dist="38100" dir="5400000" algn="t" rotWithShape="0">
+                    <a:prstClr val="black">
+                      <a:alpha val="40000"/>
+                    </a:prstClr>
+                  </a:outerShdw>
+                </a:effectLst>
                 <a:latin typeface="Montserrat" pitchFamily="2" charset="0"/>
               </a:rPr>
               <a:t>Sistema de Gestión de Taller Mecánico</a:t>
             </a:r>
-            <a:endParaRPr lang="es-ES_tradnl" sz="4400" b="1" i="1" dirty="0">
+            <a:endParaRPr lang="es-ES_tradnl" sz="4400" dirty="0">
+              <a:effectLst>
+                <a:outerShdw blurRad="50800" dist="38100" dir="5400000" algn="t" rotWithShape="0">
+                  <a:prstClr val="black">
+                    <a:alpha val="40000"/>
+                  </a:prstClr>
+                </a:outerShdw>
+              </a:effectLst>
               <a:latin typeface="Montserrat" pitchFamily="2" charset="0"/>
             </a:endParaRPr>
           </a:p>
@@ -3470,18 +3518,34 @@
         </p:nvSpPr>
         <p:spPr>
           <a:xfrm>
-            <a:off x="8517148" y="4661331"/>
-            <a:ext cx="3513826" cy="1655762"/>
+            <a:off x="8517148" y="4192438"/>
+            <a:ext cx="3513826" cy="2124655"/>
           </a:xfrm>
         </p:spPr>
         <p:txBody>
           <a:bodyPr>
-            <a:normAutofit fontScale="92500" lnSpcReduction="10000"/>
+            <a:normAutofit fontScale="85000" lnSpcReduction="20000"/>
           </a:bodyPr>
           <a:lstStyle/>
           <a:p>
-            <a:r>
-              <a:rPr lang="es-ES" dirty="0">
+            <a:pPr algn="just"/>
+            <a:r>
+              <a:rPr lang="es-ES_tradnl" dirty="0"/>
+              <a:t>Presentado por:</a:t>
+            </a:r>
+          </a:p>
+          <a:p>
+            <a:pPr algn="just"/>
+            <a:endParaRPr lang="es-ES" dirty="0">
+              <a:latin typeface="Open Sans" pitchFamily="2" charset="0"/>
+              <a:ea typeface="Open Sans" pitchFamily="2" charset="0"/>
+              <a:cs typeface="Open Sans" pitchFamily="2" charset="0"/>
+            </a:endParaRPr>
+          </a:p>
+          <a:p>
+            <a:pPr algn="just"/>
+            <a:r>
+              <a:rPr lang="es-ES" b="1" i="1" dirty="0">
                 <a:latin typeface="Open Sans" pitchFamily="2" charset="0"/>
                 <a:ea typeface="Open Sans" pitchFamily="2" charset="0"/>
                 <a:cs typeface="Open Sans" pitchFamily="2" charset="0"/>
@@ -3490,6 +3554,7 @@
             </a:r>
           </a:p>
           <a:p>
+            <a:pPr algn="just"/>
             <a:r>
               <a:rPr lang="es-ES" dirty="0">
                 <a:latin typeface="Open Sans" pitchFamily="2" charset="0"/>
@@ -3500,6 +3565,7 @@
             </a:r>
           </a:p>
           <a:p>
+            <a:pPr algn="just"/>
             <a:endParaRPr lang="es-ES" dirty="0">
               <a:latin typeface="Open Sans" pitchFamily="2" charset="0"/>
               <a:ea typeface="Open Sans" pitchFamily="2" charset="0"/>
@@ -3507,6 +3573,7 @@
             </a:endParaRPr>
           </a:p>
           <a:p>
+            <a:pPr algn="just"/>
             <a:r>
               <a:rPr lang="es-ES" dirty="0">
                 <a:latin typeface="Open Sans" pitchFamily="2" charset="0"/>
@@ -3592,6 +3659,801 @@
   <p:clrMapOvr>
     <a:masterClrMapping/>
   </p:clrMapOvr>
+  <mc:AlternateContent xmlns:mc="http://schemas.openxmlformats.org/markup-compatibility/2006">
+    <mc:Choice xmlns:p14="http://schemas.microsoft.com/office/powerpoint/2010/main" Requires="p14">
+      <p:transition spd="slow" p14:dur="900">
+        <p14:warp dir="in"/>
+      </p:transition>
+    </mc:Choice>
+    <mc:Fallback>
+      <p:transition spd="slow">
+        <p:fade/>
+      </p:transition>
+    </mc:Fallback>
+  </mc:AlternateContent>
+</p:sld>
+</file>
+
+<file path=ppt/slides/slide2.xml><?xml version="1.0" encoding="utf-8"?>
+<p:sld xmlns:a="http://schemas.openxmlformats.org/drawingml/2006/main" xmlns:r="http://schemas.openxmlformats.org/officeDocument/2006/relationships" xmlns:p="http://schemas.openxmlformats.org/presentationml/2006/main">
+  <p:cSld>
+    <p:spTree>
+      <p:nvGrpSpPr>
+        <p:cNvPr id="1" name=""/>
+        <p:cNvGrpSpPr/>
+        <p:nvPr/>
+      </p:nvGrpSpPr>
+      <p:grpSpPr>
+        <a:xfrm>
+          <a:off x="0" y="0"/>
+          <a:ext cx="0" cy="0"/>
+          <a:chOff x="0" y="0"/>
+          <a:chExt cx="0" cy="0"/>
+        </a:xfrm>
+      </p:grpSpPr>
+      <p:pic>
+        <p:nvPicPr>
+          <p:cNvPr id="3" name="Imagen 2" descr="Imagen que contiene Forma&#10;&#10;El contenido generado por IA puede ser incorrecto.">
+            <a:extLst>
+              <a:ext uri="{FF2B5EF4-FFF2-40B4-BE49-F238E27FC236}">
+                <a16:creationId xmlns:a16="http://schemas.microsoft.com/office/drawing/2014/main" id="{485EC8C7-44DC-716D-54AE-494E588C3F2E}"/>
+              </a:ext>
+            </a:extLst>
+          </p:cNvPr>
+          <p:cNvPicPr>
+            <a:picLocks noChangeAspect="1"/>
+          </p:cNvPicPr>
+          <p:nvPr/>
+        </p:nvPicPr>
+        <p:blipFill>
+          <a:blip r:embed="rId2">
+            <a:extLst>
+              <a:ext uri="{28A0092B-C50C-407E-A947-70E740481C1C}">
+                <a14:useLocalDpi xmlns:a14="http://schemas.microsoft.com/office/drawing/2010/main" val="0"/>
+              </a:ext>
+            </a:extLst>
+          </a:blip>
+          <a:stretch>
+            <a:fillRect/>
+          </a:stretch>
+        </p:blipFill>
+        <p:spPr>
+          <a:xfrm>
+            <a:off x="-10171" y="0"/>
+            <a:ext cx="12192000" cy="7178293"/>
+          </a:xfrm>
+          <a:prstGeom prst="rect">
+            <a:avLst/>
+          </a:prstGeom>
+        </p:spPr>
+      </p:pic>
+      <p:sp>
+        <p:nvSpPr>
+          <p:cNvPr id="4" name="CuadroTexto 3">
+            <a:extLst>
+              <a:ext uri="{FF2B5EF4-FFF2-40B4-BE49-F238E27FC236}">
+                <a16:creationId xmlns:a16="http://schemas.microsoft.com/office/drawing/2014/main" id="{286B1FC5-374F-A335-A7A5-74A524B63A2A}"/>
+              </a:ext>
+            </a:extLst>
+          </p:cNvPr>
+          <p:cNvSpPr txBox="1"/>
+          <p:nvPr/>
+        </p:nvSpPr>
+        <p:spPr>
+          <a:xfrm>
+            <a:off x="862441" y="289246"/>
+            <a:ext cx="1537600" cy="584775"/>
+          </a:xfrm>
+          <a:prstGeom prst="rect">
+            <a:avLst/>
+          </a:prstGeom>
+          <a:noFill/>
+        </p:spPr>
+        <p:txBody>
+          <a:bodyPr wrap="none" rtlCol="0">
+            <a:spAutoFit/>
+          </a:bodyPr>
+          <a:lstStyle/>
+          <a:p>
+            <a:pPr algn="ctr"/>
+            <a:r>
+              <a:rPr lang="es-ES" sz="3200" i="1" dirty="0">
+                <a:solidFill>
+                  <a:srgbClr val="FF0000"/>
+                </a:solidFill>
+                <a:latin typeface="Montserrat" pitchFamily="2" charset="0"/>
+                <a:ea typeface="Open Sans" pitchFamily="2" charset="0"/>
+                <a:cs typeface="Open Sans" pitchFamily="2" charset="0"/>
+              </a:rPr>
+              <a:t>Índice</a:t>
+            </a:r>
+            <a:r>
+              <a:rPr lang="es-ES" sz="3200" dirty="0">
+                <a:solidFill>
+                  <a:srgbClr val="FF0000"/>
+                </a:solidFill>
+                <a:latin typeface="Montserrat" pitchFamily="2" charset="0"/>
+                <a:ea typeface="Open Sans" pitchFamily="2" charset="0"/>
+                <a:cs typeface="Open Sans" pitchFamily="2" charset="0"/>
+              </a:rPr>
+              <a:t>:</a:t>
+            </a:r>
+            <a:endParaRPr lang="es-ES_tradnl" sz="3200" dirty="0">
+              <a:solidFill>
+                <a:srgbClr val="FF0000"/>
+              </a:solidFill>
+              <a:latin typeface="Montserrat" pitchFamily="2" charset="0"/>
+              <a:ea typeface="Open Sans" pitchFamily="2" charset="0"/>
+              <a:cs typeface="Open Sans" pitchFamily="2" charset="0"/>
+            </a:endParaRPr>
+          </a:p>
+        </p:txBody>
+      </p:sp>
+      <p:sp>
+        <p:nvSpPr>
+          <p:cNvPr id="11" name="CuadroTexto 10">
+            <a:extLst>
+              <a:ext uri="{FF2B5EF4-FFF2-40B4-BE49-F238E27FC236}">
+                <a16:creationId xmlns:a16="http://schemas.microsoft.com/office/drawing/2014/main" id="{2924BCFA-EF65-663B-FFE7-9A0ED7CFCF2D}"/>
+              </a:ext>
+            </a:extLst>
+          </p:cNvPr>
+          <p:cNvSpPr txBox="1"/>
+          <p:nvPr/>
+        </p:nvSpPr>
+        <p:spPr>
+          <a:xfrm>
+            <a:off x="3177800" y="1500880"/>
+            <a:ext cx="4095993" cy="461665"/>
+          </a:xfrm>
+          <a:prstGeom prst="rect">
+            <a:avLst/>
+          </a:prstGeom>
+          <a:noFill/>
+        </p:spPr>
+        <p:txBody>
+          <a:bodyPr wrap="none" rtlCol="0" anchor="ctr">
+            <a:spAutoFit/>
+          </a:bodyPr>
+          <a:lstStyle/>
+          <a:p>
+            <a:r>
+              <a:rPr lang="es-ES" sz="2400" dirty="0">
+                <a:solidFill>
+                  <a:srgbClr val="FF0000"/>
+                </a:solidFill>
+                <a:latin typeface="Open Sans" pitchFamily="2" charset="0"/>
+                <a:ea typeface="Open Sans" pitchFamily="2" charset="0"/>
+                <a:cs typeface="Open Sans" pitchFamily="2" charset="0"/>
+              </a:rPr>
+              <a:t>1.</a:t>
+            </a:r>
+            <a:r>
+              <a:rPr lang="es-ES" sz="2400" dirty="0">
+                <a:latin typeface="Open Sans" pitchFamily="2" charset="0"/>
+                <a:ea typeface="Open Sans" pitchFamily="2" charset="0"/>
+                <a:cs typeface="Open Sans" pitchFamily="2" charset="0"/>
+              </a:rPr>
+              <a:t>  Introducción al proyecto</a:t>
+            </a:r>
+            <a:endParaRPr lang="es-ES_tradnl" sz="2400" dirty="0">
+              <a:latin typeface="Open Sans" pitchFamily="2" charset="0"/>
+              <a:ea typeface="Open Sans" pitchFamily="2" charset="0"/>
+              <a:cs typeface="Open Sans" pitchFamily="2" charset="0"/>
+            </a:endParaRPr>
+          </a:p>
+        </p:txBody>
+      </p:sp>
+      <p:sp>
+        <p:nvSpPr>
+          <p:cNvPr id="12" name="CuadroTexto 11">
+            <a:extLst>
+              <a:ext uri="{FF2B5EF4-FFF2-40B4-BE49-F238E27FC236}">
+                <a16:creationId xmlns:a16="http://schemas.microsoft.com/office/drawing/2014/main" id="{25E968A7-1796-E277-12A2-9ED7C2AD3F67}"/>
+              </a:ext>
+            </a:extLst>
+          </p:cNvPr>
+          <p:cNvSpPr txBox="1"/>
+          <p:nvPr/>
+        </p:nvSpPr>
+        <p:spPr>
+          <a:xfrm>
+            <a:off x="3708526" y="1966014"/>
+            <a:ext cx="1949573" cy="461665"/>
+          </a:xfrm>
+          <a:prstGeom prst="rect">
+            <a:avLst/>
+          </a:prstGeom>
+          <a:noFill/>
+        </p:spPr>
+        <p:txBody>
+          <a:bodyPr wrap="none" rtlCol="0" anchor="ctr">
+            <a:spAutoFit/>
+          </a:bodyPr>
+          <a:lstStyle/>
+          <a:p>
+            <a:r>
+              <a:rPr lang="es-ES" sz="2400" dirty="0">
+                <a:solidFill>
+                  <a:srgbClr val="FF0000"/>
+                </a:solidFill>
+                <a:latin typeface="Open Sans" pitchFamily="2" charset="0"/>
+                <a:ea typeface="Open Sans" pitchFamily="2" charset="0"/>
+                <a:cs typeface="Open Sans" pitchFamily="2" charset="0"/>
+              </a:rPr>
+              <a:t>2.</a:t>
+            </a:r>
+            <a:r>
+              <a:rPr lang="es-ES" sz="2400" dirty="0">
+                <a:latin typeface="Open Sans" pitchFamily="2" charset="0"/>
+                <a:ea typeface="Open Sans" pitchFamily="2" charset="0"/>
+                <a:cs typeface="Open Sans" pitchFamily="2" charset="0"/>
+              </a:rPr>
+              <a:t>  Objetivos</a:t>
+            </a:r>
+          </a:p>
+        </p:txBody>
+      </p:sp>
+      <p:sp>
+        <p:nvSpPr>
+          <p:cNvPr id="13" name="CuadroTexto 12">
+            <a:extLst>
+              <a:ext uri="{FF2B5EF4-FFF2-40B4-BE49-F238E27FC236}">
+                <a16:creationId xmlns:a16="http://schemas.microsoft.com/office/drawing/2014/main" id="{5044A187-2054-CA83-DDFE-B32850EDB60B}"/>
+              </a:ext>
+            </a:extLst>
+          </p:cNvPr>
+          <p:cNvSpPr txBox="1"/>
+          <p:nvPr/>
+        </p:nvSpPr>
+        <p:spPr>
+          <a:xfrm>
+            <a:off x="4026883" y="2423232"/>
+            <a:ext cx="3810659" cy="461665"/>
+          </a:xfrm>
+          <a:prstGeom prst="rect">
+            <a:avLst/>
+          </a:prstGeom>
+          <a:noFill/>
+        </p:spPr>
+        <p:txBody>
+          <a:bodyPr wrap="none" rtlCol="0" anchor="ctr">
+            <a:spAutoFit/>
+          </a:bodyPr>
+          <a:lstStyle/>
+          <a:p>
+            <a:r>
+              <a:rPr lang="es-ES" sz="2400" dirty="0">
+                <a:solidFill>
+                  <a:srgbClr val="FF0000"/>
+                </a:solidFill>
+                <a:latin typeface="Open Sans" pitchFamily="2" charset="0"/>
+                <a:ea typeface="Open Sans" pitchFamily="2" charset="0"/>
+                <a:cs typeface="Open Sans" pitchFamily="2" charset="0"/>
+              </a:rPr>
+              <a:t>3.</a:t>
+            </a:r>
+            <a:r>
+              <a:rPr lang="es-ES" sz="2400" dirty="0">
+                <a:latin typeface="Open Sans" pitchFamily="2" charset="0"/>
+                <a:ea typeface="Open Sans" pitchFamily="2" charset="0"/>
+                <a:cs typeface="Open Sans" pitchFamily="2" charset="0"/>
+              </a:rPr>
+              <a:t>  Problemas detectados</a:t>
+            </a:r>
+            <a:endParaRPr lang="es-ES_tradnl" sz="2400" dirty="0">
+              <a:latin typeface="Open Sans" pitchFamily="2" charset="0"/>
+              <a:ea typeface="Open Sans" pitchFamily="2" charset="0"/>
+              <a:cs typeface="Open Sans" pitchFamily="2" charset="0"/>
+            </a:endParaRPr>
+          </a:p>
+        </p:txBody>
+      </p:sp>
+      <p:sp>
+        <p:nvSpPr>
+          <p:cNvPr id="14" name="CuadroTexto 13">
+            <a:extLst>
+              <a:ext uri="{FF2B5EF4-FFF2-40B4-BE49-F238E27FC236}">
+                <a16:creationId xmlns:a16="http://schemas.microsoft.com/office/drawing/2014/main" id="{8A7E64FA-C8F7-A966-ED99-B64EF4EEE9B3}"/>
+              </a:ext>
+            </a:extLst>
+          </p:cNvPr>
+          <p:cNvSpPr txBox="1"/>
+          <p:nvPr/>
+        </p:nvSpPr>
+        <p:spPr>
+          <a:xfrm>
+            <a:off x="4145902" y="2883039"/>
+            <a:ext cx="3373039" cy="461665"/>
+          </a:xfrm>
+          <a:prstGeom prst="rect">
+            <a:avLst/>
+          </a:prstGeom>
+          <a:noFill/>
+        </p:spPr>
+        <p:txBody>
+          <a:bodyPr wrap="none" rtlCol="0" anchor="ctr">
+            <a:spAutoFit/>
+          </a:bodyPr>
+          <a:lstStyle/>
+          <a:p>
+            <a:r>
+              <a:rPr lang="es-ES" sz="2400" dirty="0">
+                <a:solidFill>
+                  <a:srgbClr val="FF0000"/>
+                </a:solidFill>
+                <a:latin typeface="Open Sans" pitchFamily="2" charset="0"/>
+                <a:ea typeface="Open Sans" pitchFamily="2" charset="0"/>
+                <a:cs typeface="Open Sans" pitchFamily="2" charset="0"/>
+              </a:rPr>
+              <a:t>4.</a:t>
+            </a:r>
+            <a:r>
+              <a:rPr lang="es-ES" sz="2400" dirty="0">
+                <a:latin typeface="Open Sans" pitchFamily="2" charset="0"/>
+                <a:ea typeface="Open Sans" pitchFamily="2" charset="0"/>
+                <a:cs typeface="Open Sans" pitchFamily="2" charset="0"/>
+              </a:rPr>
+              <a:t>  Solución propuesta</a:t>
+            </a:r>
+            <a:endParaRPr lang="es-ES_tradnl" sz="2400" dirty="0">
+              <a:latin typeface="Open Sans" pitchFamily="2" charset="0"/>
+              <a:ea typeface="Open Sans" pitchFamily="2" charset="0"/>
+              <a:cs typeface="Open Sans" pitchFamily="2" charset="0"/>
+            </a:endParaRPr>
+          </a:p>
+        </p:txBody>
+      </p:sp>
+      <p:sp>
+        <p:nvSpPr>
+          <p:cNvPr id="15" name="CuadroTexto 14">
+            <a:extLst>
+              <a:ext uri="{FF2B5EF4-FFF2-40B4-BE49-F238E27FC236}">
+                <a16:creationId xmlns:a16="http://schemas.microsoft.com/office/drawing/2014/main" id="{139AE48C-9A9F-1327-3110-A729A08104DE}"/>
+              </a:ext>
+            </a:extLst>
+          </p:cNvPr>
+          <p:cNvSpPr txBox="1"/>
+          <p:nvPr/>
+        </p:nvSpPr>
+        <p:spPr>
+          <a:xfrm>
+            <a:off x="4283364" y="3340988"/>
+            <a:ext cx="3722494" cy="461665"/>
+          </a:xfrm>
+          <a:prstGeom prst="rect">
+            <a:avLst/>
+          </a:prstGeom>
+          <a:noFill/>
+        </p:spPr>
+        <p:txBody>
+          <a:bodyPr wrap="none" rtlCol="0" anchor="ctr">
+            <a:spAutoFit/>
+          </a:bodyPr>
+          <a:lstStyle/>
+          <a:p>
+            <a:r>
+              <a:rPr lang="es-ES" sz="2400" dirty="0">
+                <a:solidFill>
+                  <a:srgbClr val="FF0000"/>
+                </a:solidFill>
+                <a:latin typeface="Open Sans" pitchFamily="2" charset="0"/>
+                <a:ea typeface="Open Sans" pitchFamily="2" charset="0"/>
+                <a:cs typeface="Open Sans" pitchFamily="2" charset="0"/>
+              </a:rPr>
+              <a:t>5.</a:t>
+            </a:r>
+            <a:r>
+              <a:rPr lang="es-ES" sz="2400" dirty="0">
+                <a:latin typeface="Open Sans" pitchFamily="2" charset="0"/>
+                <a:ea typeface="Open Sans" pitchFamily="2" charset="0"/>
+                <a:cs typeface="Open Sans" pitchFamily="2" charset="0"/>
+              </a:rPr>
+              <a:t>  Tecnologías utilizadas</a:t>
+            </a:r>
+            <a:endParaRPr lang="es-ES_tradnl" sz="2400" dirty="0">
+              <a:latin typeface="Open Sans" pitchFamily="2" charset="0"/>
+              <a:ea typeface="Open Sans" pitchFamily="2" charset="0"/>
+              <a:cs typeface="Open Sans" pitchFamily="2" charset="0"/>
+            </a:endParaRPr>
+          </a:p>
+        </p:txBody>
+      </p:sp>
+      <p:sp>
+        <p:nvSpPr>
+          <p:cNvPr id="16" name="CuadroTexto 15">
+            <a:extLst>
+              <a:ext uri="{FF2B5EF4-FFF2-40B4-BE49-F238E27FC236}">
+                <a16:creationId xmlns:a16="http://schemas.microsoft.com/office/drawing/2014/main" id="{987EEFD7-7D75-BA7F-CB06-F35FA9D55302}"/>
+              </a:ext>
+            </a:extLst>
+          </p:cNvPr>
+          <p:cNvSpPr txBox="1"/>
+          <p:nvPr/>
+        </p:nvSpPr>
+        <p:spPr>
+          <a:xfrm>
+            <a:off x="4318911" y="3800064"/>
+            <a:ext cx="3554178" cy="461665"/>
+          </a:xfrm>
+          <a:prstGeom prst="rect">
+            <a:avLst/>
+          </a:prstGeom>
+          <a:noFill/>
+        </p:spPr>
+        <p:txBody>
+          <a:bodyPr wrap="none" rtlCol="0" anchor="ctr">
+            <a:spAutoFit/>
+          </a:bodyPr>
+          <a:lstStyle/>
+          <a:p>
+            <a:r>
+              <a:rPr lang="es-ES" sz="2400" dirty="0">
+                <a:solidFill>
+                  <a:srgbClr val="FF0000"/>
+                </a:solidFill>
+                <a:latin typeface="Open Sans" pitchFamily="2" charset="0"/>
+                <a:ea typeface="Open Sans" pitchFamily="2" charset="0"/>
+                <a:cs typeface="Open Sans" pitchFamily="2" charset="0"/>
+              </a:rPr>
+              <a:t>6.</a:t>
+            </a:r>
+            <a:r>
+              <a:rPr lang="es-ES" sz="2400" dirty="0">
+                <a:latin typeface="Open Sans" pitchFamily="2" charset="0"/>
+                <a:ea typeface="Open Sans" pitchFamily="2" charset="0"/>
+                <a:cs typeface="Open Sans" pitchFamily="2" charset="0"/>
+              </a:rPr>
+              <a:t>  Arquitectura general</a:t>
+            </a:r>
+            <a:endParaRPr lang="es-ES_tradnl" sz="2400" dirty="0">
+              <a:latin typeface="Open Sans" pitchFamily="2" charset="0"/>
+              <a:ea typeface="Open Sans" pitchFamily="2" charset="0"/>
+              <a:cs typeface="Open Sans" pitchFamily="2" charset="0"/>
+            </a:endParaRPr>
+          </a:p>
+        </p:txBody>
+      </p:sp>
+      <p:sp>
+        <p:nvSpPr>
+          <p:cNvPr id="17" name="CuadroTexto 16">
+            <a:extLst>
+              <a:ext uri="{FF2B5EF4-FFF2-40B4-BE49-F238E27FC236}">
+                <a16:creationId xmlns:a16="http://schemas.microsoft.com/office/drawing/2014/main" id="{99341081-3068-BA24-BC64-AF065CF08022}"/>
+              </a:ext>
+            </a:extLst>
+          </p:cNvPr>
+          <p:cNvSpPr txBox="1"/>
+          <p:nvPr/>
+        </p:nvSpPr>
+        <p:spPr>
+          <a:xfrm>
+            <a:off x="4342695" y="4260357"/>
+            <a:ext cx="3411511" cy="461665"/>
+          </a:xfrm>
+          <a:prstGeom prst="rect">
+            <a:avLst/>
+          </a:prstGeom>
+          <a:noFill/>
+        </p:spPr>
+        <p:txBody>
+          <a:bodyPr wrap="none" rtlCol="0" anchor="ctr">
+            <a:spAutoFit/>
+          </a:bodyPr>
+          <a:lstStyle/>
+          <a:p>
+            <a:r>
+              <a:rPr lang="es-ES" sz="2400" dirty="0">
+                <a:solidFill>
+                  <a:srgbClr val="FF0000"/>
+                </a:solidFill>
+                <a:latin typeface="Open Sans" pitchFamily="2" charset="0"/>
+                <a:ea typeface="Open Sans" pitchFamily="2" charset="0"/>
+                <a:cs typeface="Open Sans" pitchFamily="2" charset="0"/>
+              </a:rPr>
+              <a:t>7.</a:t>
+            </a:r>
+            <a:r>
+              <a:rPr lang="es-ES" sz="2400" dirty="0">
+                <a:latin typeface="Open Sans" pitchFamily="2" charset="0"/>
+                <a:ea typeface="Open Sans" pitchFamily="2" charset="0"/>
+                <a:cs typeface="Open Sans" pitchFamily="2" charset="0"/>
+              </a:rPr>
+              <a:t>  Funcionalidad clave</a:t>
+            </a:r>
+            <a:endParaRPr lang="es-ES_tradnl" sz="2400" dirty="0">
+              <a:latin typeface="Open Sans" pitchFamily="2" charset="0"/>
+              <a:ea typeface="Open Sans" pitchFamily="2" charset="0"/>
+              <a:cs typeface="Open Sans" pitchFamily="2" charset="0"/>
+            </a:endParaRPr>
+          </a:p>
+        </p:txBody>
+      </p:sp>
+      <p:sp>
+        <p:nvSpPr>
+          <p:cNvPr id="18" name="CuadroTexto 17">
+            <a:extLst>
+              <a:ext uri="{FF2B5EF4-FFF2-40B4-BE49-F238E27FC236}">
+                <a16:creationId xmlns:a16="http://schemas.microsoft.com/office/drawing/2014/main" id="{42D1A08A-089E-47B6-1DF8-0853F89CA897}"/>
+              </a:ext>
+            </a:extLst>
+          </p:cNvPr>
+          <p:cNvSpPr txBox="1"/>
+          <p:nvPr/>
+        </p:nvSpPr>
+        <p:spPr>
+          <a:xfrm>
+            <a:off x="4318911" y="4718061"/>
+            <a:ext cx="3852337" cy="461665"/>
+          </a:xfrm>
+          <a:prstGeom prst="rect">
+            <a:avLst/>
+          </a:prstGeom>
+          <a:noFill/>
+        </p:spPr>
+        <p:txBody>
+          <a:bodyPr wrap="none" rtlCol="0" anchor="ctr">
+            <a:spAutoFit/>
+          </a:bodyPr>
+          <a:lstStyle/>
+          <a:p>
+            <a:r>
+              <a:rPr lang="es-ES" sz="2400" dirty="0">
+                <a:solidFill>
+                  <a:srgbClr val="FF0000"/>
+                </a:solidFill>
+                <a:latin typeface="Open Sans" pitchFamily="2" charset="0"/>
+                <a:ea typeface="Open Sans" pitchFamily="2" charset="0"/>
+                <a:cs typeface="Open Sans" pitchFamily="2" charset="0"/>
+              </a:rPr>
+              <a:t>8.</a:t>
+            </a:r>
+            <a:r>
+              <a:rPr lang="es-ES" sz="2400" dirty="0">
+                <a:latin typeface="Open Sans" pitchFamily="2" charset="0"/>
+                <a:ea typeface="Open Sans" pitchFamily="2" charset="0"/>
+                <a:cs typeface="Open Sans" pitchFamily="2" charset="0"/>
+              </a:rPr>
+              <a:t>  Pruebas y validaciones</a:t>
+            </a:r>
+            <a:endParaRPr lang="es-ES_tradnl" sz="2400" dirty="0">
+              <a:latin typeface="Open Sans" pitchFamily="2" charset="0"/>
+              <a:ea typeface="Open Sans" pitchFamily="2" charset="0"/>
+              <a:cs typeface="Open Sans" pitchFamily="2" charset="0"/>
+            </a:endParaRPr>
+          </a:p>
+        </p:txBody>
+      </p:sp>
+      <p:sp>
+        <p:nvSpPr>
+          <p:cNvPr id="19" name="CuadroTexto 18">
+            <a:extLst>
+              <a:ext uri="{FF2B5EF4-FFF2-40B4-BE49-F238E27FC236}">
+                <a16:creationId xmlns:a16="http://schemas.microsoft.com/office/drawing/2014/main" id="{7936AD03-2E9F-5A94-274F-CDF161D17B23}"/>
+              </a:ext>
+            </a:extLst>
+          </p:cNvPr>
+          <p:cNvSpPr txBox="1"/>
+          <p:nvPr/>
+        </p:nvSpPr>
+        <p:spPr>
+          <a:xfrm>
+            <a:off x="4206825" y="5177868"/>
+            <a:ext cx="4028667" cy="461665"/>
+          </a:xfrm>
+          <a:prstGeom prst="rect">
+            <a:avLst/>
+          </a:prstGeom>
+          <a:noFill/>
+        </p:spPr>
+        <p:txBody>
+          <a:bodyPr wrap="none" rtlCol="0" anchor="ctr">
+            <a:spAutoFit/>
+          </a:bodyPr>
+          <a:lstStyle/>
+          <a:p>
+            <a:r>
+              <a:rPr lang="es-ES" sz="2400" dirty="0">
+                <a:solidFill>
+                  <a:srgbClr val="FF0000"/>
+                </a:solidFill>
+                <a:latin typeface="Open Sans" pitchFamily="2" charset="0"/>
+                <a:ea typeface="Open Sans" pitchFamily="2" charset="0"/>
+                <a:cs typeface="Open Sans" pitchFamily="2" charset="0"/>
+              </a:rPr>
+              <a:t>9.</a:t>
+            </a:r>
+            <a:r>
+              <a:rPr lang="es-ES" sz="2400" dirty="0">
+                <a:latin typeface="Open Sans" pitchFamily="2" charset="0"/>
+                <a:ea typeface="Open Sans" pitchFamily="2" charset="0"/>
+                <a:cs typeface="Open Sans" pitchFamily="2" charset="0"/>
+              </a:rPr>
+              <a:t>  Documentación general</a:t>
+            </a:r>
+            <a:endParaRPr lang="es-ES_tradnl" sz="2400" dirty="0">
+              <a:latin typeface="Open Sans" pitchFamily="2" charset="0"/>
+              <a:ea typeface="Open Sans" pitchFamily="2" charset="0"/>
+              <a:cs typeface="Open Sans" pitchFamily="2" charset="0"/>
+            </a:endParaRPr>
+          </a:p>
+        </p:txBody>
+      </p:sp>
+      <p:sp>
+        <p:nvSpPr>
+          <p:cNvPr id="20" name="CuadroTexto 19">
+            <a:extLst>
+              <a:ext uri="{FF2B5EF4-FFF2-40B4-BE49-F238E27FC236}">
+                <a16:creationId xmlns:a16="http://schemas.microsoft.com/office/drawing/2014/main" id="{83D20213-15BF-8084-3F76-84E9A83F8DEE}"/>
+              </a:ext>
+            </a:extLst>
+          </p:cNvPr>
+          <p:cNvSpPr txBox="1"/>
+          <p:nvPr/>
+        </p:nvSpPr>
+        <p:spPr>
+          <a:xfrm>
+            <a:off x="3962629" y="5637675"/>
+            <a:ext cx="5270995" cy="461665"/>
+          </a:xfrm>
+          <a:prstGeom prst="rect">
+            <a:avLst/>
+          </a:prstGeom>
+          <a:noFill/>
+        </p:spPr>
+        <p:txBody>
+          <a:bodyPr wrap="none" rtlCol="0" anchor="ctr">
+            <a:spAutoFit/>
+          </a:bodyPr>
+          <a:lstStyle/>
+          <a:p>
+            <a:r>
+              <a:rPr lang="es-ES" sz="2400" dirty="0">
+                <a:solidFill>
+                  <a:srgbClr val="FF0000"/>
+                </a:solidFill>
+                <a:latin typeface="Open Sans" pitchFamily="2" charset="0"/>
+                <a:ea typeface="Open Sans" pitchFamily="2" charset="0"/>
+                <a:cs typeface="Open Sans" pitchFamily="2" charset="0"/>
+              </a:rPr>
+              <a:t>10.</a:t>
+            </a:r>
+            <a:r>
+              <a:rPr lang="es-ES" sz="2400" dirty="0">
+                <a:latin typeface="Open Sans" pitchFamily="2" charset="0"/>
+                <a:ea typeface="Open Sans" pitchFamily="2" charset="0"/>
+                <a:cs typeface="Open Sans" pitchFamily="2" charset="0"/>
+              </a:rPr>
+              <a:t>  Conclusiones y mejoras futuras</a:t>
+            </a:r>
+            <a:endParaRPr lang="es-ES_tradnl" sz="2400" dirty="0">
+              <a:latin typeface="Open Sans" pitchFamily="2" charset="0"/>
+              <a:ea typeface="Open Sans" pitchFamily="2" charset="0"/>
+              <a:cs typeface="Open Sans" pitchFamily="2" charset="0"/>
+            </a:endParaRPr>
+          </a:p>
+        </p:txBody>
+      </p:sp>
+      <p:sp>
+        <p:nvSpPr>
+          <p:cNvPr id="21" name="CuadroTexto 20">
+            <a:extLst>
+              <a:ext uri="{FF2B5EF4-FFF2-40B4-BE49-F238E27FC236}">
+                <a16:creationId xmlns:a16="http://schemas.microsoft.com/office/drawing/2014/main" id="{1D387948-5E50-4099-E15F-E59A669455BD}"/>
+              </a:ext>
+            </a:extLst>
+          </p:cNvPr>
+          <p:cNvSpPr txBox="1"/>
+          <p:nvPr/>
+        </p:nvSpPr>
+        <p:spPr>
+          <a:xfrm>
+            <a:off x="3769449" y="6099340"/>
+            <a:ext cx="2234907" cy="461665"/>
+          </a:xfrm>
+          <a:prstGeom prst="rect">
+            <a:avLst/>
+          </a:prstGeom>
+          <a:noFill/>
+        </p:spPr>
+        <p:txBody>
+          <a:bodyPr wrap="none" rtlCol="0" anchor="ctr">
+            <a:spAutoFit/>
+          </a:bodyPr>
+          <a:lstStyle/>
+          <a:p>
+            <a:r>
+              <a:rPr lang="es-ES" sz="2400" dirty="0">
+                <a:solidFill>
+                  <a:srgbClr val="FF0000"/>
+                </a:solidFill>
+                <a:latin typeface="Open Sans" pitchFamily="2" charset="0"/>
+                <a:ea typeface="Open Sans" pitchFamily="2" charset="0"/>
+                <a:cs typeface="Open Sans" pitchFamily="2" charset="0"/>
+              </a:rPr>
+              <a:t>11.</a:t>
+            </a:r>
+            <a:r>
+              <a:rPr lang="es-ES" sz="2400" dirty="0">
+                <a:latin typeface="Open Sans" pitchFamily="2" charset="0"/>
+                <a:ea typeface="Open Sans" pitchFamily="2" charset="0"/>
+                <a:cs typeface="Open Sans" pitchFamily="2" charset="0"/>
+              </a:rPr>
+              <a:t>  Preguntas</a:t>
+            </a:r>
+            <a:endParaRPr lang="es-ES_tradnl" sz="2400" dirty="0">
+              <a:latin typeface="Open Sans" pitchFamily="2" charset="0"/>
+              <a:ea typeface="Open Sans" pitchFamily="2" charset="0"/>
+              <a:cs typeface="Open Sans" pitchFamily="2" charset="0"/>
+            </a:endParaRPr>
+          </a:p>
+        </p:txBody>
+      </p:sp>
+      <p:cxnSp>
+        <p:nvCxnSpPr>
+          <p:cNvPr id="23" name="Conector recto 22">
+            <a:extLst>
+              <a:ext uri="{FF2B5EF4-FFF2-40B4-BE49-F238E27FC236}">
+                <a16:creationId xmlns:a16="http://schemas.microsoft.com/office/drawing/2014/main" id="{F13A05DD-CD60-A4D4-75E6-EBF121C2258B}"/>
+              </a:ext>
+            </a:extLst>
+          </p:cNvPr>
+          <p:cNvCxnSpPr>
+            <a:cxnSpLocks/>
+          </p:cNvCxnSpPr>
+          <p:nvPr/>
+        </p:nvCxnSpPr>
+        <p:spPr>
+          <a:xfrm>
+            <a:off x="822366" y="871333"/>
+            <a:ext cx="9428671" cy="0"/>
+          </a:xfrm>
+          <a:prstGeom prst="line">
+            <a:avLst/>
+          </a:prstGeom>
+          <a:ln>
+            <a:solidFill>
+              <a:srgbClr val="454545"/>
+            </a:solidFill>
+          </a:ln>
+        </p:spPr>
+        <p:style>
+          <a:lnRef idx="3">
+            <a:schemeClr val="accent1"/>
+          </a:lnRef>
+          <a:fillRef idx="0">
+            <a:schemeClr val="accent1"/>
+          </a:fillRef>
+          <a:effectRef idx="2">
+            <a:schemeClr val="accent1"/>
+          </a:effectRef>
+          <a:fontRef idx="minor">
+            <a:schemeClr val="tx1"/>
+          </a:fontRef>
+        </p:style>
+      </p:cxnSp>
+    </p:spTree>
+    <p:extLst>
+      <p:ext uri="{BB962C8B-B14F-4D97-AF65-F5344CB8AC3E}">
+        <p14:creationId xmlns:p14="http://schemas.microsoft.com/office/powerpoint/2010/main" val="3068707301"/>
+      </p:ext>
+    </p:extLst>
+  </p:cSld>
+  <p:clrMapOvr>
+    <a:masterClrMapping/>
+  </p:clrMapOvr>
+  <mc:AlternateContent xmlns:mc="http://schemas.openxmlformats.org/markup-compatibility/2006">
+    <mc:Choice xmlns:p14="http://schemas.microsoft.com/office/powerpoint/2010/main" Requires="p14">
+      <p:transition spd="slow" p14:dur="1600">
+        <p:blinds dir="vert"/>
+      </p:transition>
+    </mc:Choice>
+    <mc:Fallback>
+      <p:transition spd="slow">
+        <p:blinds dir="vert"/>
+      </p:transition>
+    </mc:Fallback>
+  </mc:AlternateContent>
 </p:sld>
 </file>
 

</xml_diff>